<commit_message>
Added new files and new pages in presentations
</commit_message>
<xml_diff>
--- a/Präsentationen/CSS.pptx
+++ b/Präsentationen/CSS.pptx
@@ -5,7 +5,7 @@
     <p:sldMasterId id="2147483660" r:id="rId4"/>
   </p:sldMasterIdLst>
   <p:notesMasterIdLst>
-    <p:notesMasterId r:id="rId31"/>
+    <p:notesMasterId r:id="rId32"/>
   </p:notesMasterIdLst>
   <p:sldIdLst>
     <p:sldId id="256" r:id="rId5"/>
@@ -31,9 +31,10 @@
     <p:sldId id="271" r:id="rId25"/>
     <p:sldId id="275" r:id="rId26"/>
     <p:sldId id="274" r:id="rId27"/>
-    <p:sldId id="277" r:id="rId28"/>
-    <p:sldId id="278" r:id="rId29"/>
-    <p:sldId id="279" r:id="rId30"/>
+    <p:sldId id="282" r:id="rId28"/>
+    <p:sldId id="277" r:id="rId29"/>
+    <p:sldId id="278" r:id="rId30"/>
+    <p:sldId id="279" r:id="rId31"/>
   </p:sldIdLst>
   <p:sldSz cx="12192000" cy="6858000"/>
   <p:notesSz cx="6858000" cy="9144000"/>
@@ -222,7 +223,7 @@
           <a:p>
             <a:fld id="{03614270-362A-4062-82C0-5646FFAE32F7}" type="datetimeFigureOut">
               <a:rPr lang="de-CH" smtClean="0"/>
-              <a:t>18.03.2015</a:t>
+              <a:t>08.04.2015</a:t>
             </a:fld>
             <a:endParaRPr lang="de-CH"/>
           </a:p>
@@ -536,7 +537,7 @@
           <a:p>
             <a:r>
               <a:rPr lang="de-CH" dirty="0" smtClean="0"/>
-              <a:t>Demo zeigen</a:t>
+              <a:t>css_einbindung.html</a:t>
             </a:r>
             <a:endParaRPr lang="de-CH" dirty="0"/>
           </a:p>
@@ -559,7 +560,7 @@
           <a:p>
             <a:fld id="{2757A091-AEE2-4DA2-90B8-7B6B6A595E0D}" type="slidenum">
               <a:rPr lang="de-CH" smtClean="0"/>
-              <a:t>10</a:t>
+              <a:t>8</a:t>
             </a:fld>
             <a:endParaRPr lang="de-CH"/>
           </a:p>
@@ -568,7 +569,102 @@
     </p:spTree>
     <p:extLst>
       <p:ext uri="{BB962C8B-B14F-4D97-AF65-F5344CB8AC3E}">
-        <p14:creationId xmlns:p14="http://schemas.microsoft.com/office/powerpoint/2010/main" val="4281701272"/>
+        <p14:creationId xmlns:p14="http://schemas.microsoft.com/office/powerpoint/2010/main" val="1377878422"/>
+      </p:ext>
+    </p:extLst>
+  </p:cSld>
+  <p:clrMapOvr>
+    <a:masterClrMapping/>
+  </p:clrMapOvr>
+</p:notes>
+</file>
+
+<file path=ppt/notesSlides/notesSlide10.xml><?xml version="1.0" encoding="utf-8"?>
+<p:notes xmlns:a="http://schemas.openxmlformats.org/drawingml/2006/main" xmlns:r="http://schemas.openxmlformats.org/officeDocument/2006/relationships" xmlns:p="http://schemas.openxmlformats.org/presentationml/2006/main">
+  <p:cSld>
+    <p:spTree>
+      <p:nvGrpSpPr>
+        <p:cNvPr id="1" name=""/>
+        <p:cNvGrpSpPr/>
+        <p:nvPr/>
+      </p:nvGrpSpPr>
+      <p:grpSpPr>
+        <a:xfrm>
+          <a:off x="0" y="0"/>
+          <a:ext cx="0" cy="0"/>
+          <a:chOff x="0" y="0"/>
+          <a:chExt cx="0" cy="0"/>
+        </a:xfrm>
+      </p:grpSpPr>
+      <p:sp>
+        <p:nvSpPr>
+          <p:cNvPr id="2" name="Folienbildplatzhalter 1"/>
+          <p:cNvSpPr>
+            <a:spLocks noGrp="1" noRot="1" noChangeAspect="1"/>
+          </p:cNvSpPr>
+          <p:nvPr>
+            <p:ph type="sldImg"/>
+          </p:nvPr>
+        </p:nvSpPr>
+        <p:spPr/>
+      </p:sp>
+      <p:sp>
+        <p:nvSpPr>
+          <p:cNvPr id="3" name="Notizenplatzhalter 2"/>
+          <p:cNvSpPr>
+            <a:spLocks noGrp="1"/>
+          </p:cNvSpPr>
+          <p:nvPr>
+            <p:ph type="body" idx="1"/>
+          </p:nvPr>
+        </p:nvSpPr>
+        <p:spPr/>
+        <p:txBody>
+          <a:bodyPr/>
+          <a:lstStyle/>
+          <a:p>
+            <a:r>
+              <a:rPr lang="de-CH" dirty="0" err="1" smtClean="0"/>
+              <a:t>demo</a:t>
+            </a:r>
+            <a:endParaRPr lang="de-CH" dirty="0" smtClean="0"/>
+          </a:p>
+          <a:p>
+            <a:r>
+              <a:rPr lang="de-CH" dirty="0" smtClean="0"/>
+              <a:t>css_display.html</a:t>
+            </a:r>
+            <a:endParaRPr lang="de-CH" dirty="0"/>
+          </a:p>
+        </p:txBody>
+      </p:sp>
+      <p:sp>
+        <p:nvSpPr>
+          <p:cNvPr id="4" name="Foliennummernplatzhalter 3"/>
+          <p:cNvSpPr>
+            <a:spLocks noGrp="1"/>
+          </p:cNvSpPr>
+          <p:nvPr>
+            <p:ph type="sldNum" sz="quarter" idx="10"/>
+          </p:nvPr>
+        </p:nvSpPr>
+        <p:spPr/>
+        <p:txBody>
+          <a:bodyPr/>
+          <a:lstStyle/>
+          <a:p>
+            <a:fld id="{2757A091-AEE2-4DA2-90B8-7B6B6A595E0D}" type="slidenum">
+              <a:rPr lang="de-CH" smtClean="0"/>
+              <a:t>24</a:t>
+            </a:fld>
+            <a:endParaRPr lang="de-CH"/>
+          </a:p>
+        </p:txBody>
+      </p:sp>
+    </p:spTree>
+    <p:extLst>
+      <p:ext uri="{BB962C8B-B14F-4D97-AF65-F5344CB8AC3E}">
+        <p14:creationId xmlns:p14="http://schemas.microsoft.com/office/powerpoint/2010/main" val="18809279"/>
       </p:ext>
     </p:extLst>
   </p:cSld>
@@ -647,6 +743,94 @@
           <a:p>
             <a:fld id="{2757A091-AEE2-4DA2-90B8-7B6B6A595E0D}" type="slidenum">
               <a:rPr lang="de-CH" smtClean="0"/>
+              <a:t>10</a:t>
+            </a:fld>
+            <a:endParaRPr lang="de-CH"/>
+          </a:p>
+        </p:txBody>
+      </p:sp>
+    </p:spTree>
+    <p:extLst>
+      <p:ext uri="{BB962C8B-B14F-4D97-AF65-F5344CB8AC3E}">
+        <p14:creationId xmlns:p14="http://schemas.microsoft.com/office/powerpoint/2010/main" val="4281701272"/>
+      </p:ext>
+    </p:extLst>
+  </p:cSld>
+  <p:clrMapOvr>
+    <a:masterClrMapping/>
+  </p:clrMapOvr>
+</p:notes>
+</file>
+
+<file path=ppt/notesSlides/notesSlide3.xml><?xml version="1.0" encoding="utf-8"?>
+<p:notes xmlns:a="http://schemas.openxmlformats.org/drawingml/2006/main" xmlns:r="http://schemas.openxmlformats.org/officeDocument/2006/relationships" xmlns:p="http://schemas.openxmlformats.org/presentationml/2006/main">
+  <p:cSld>
+    <p:spTree>
+      <p:nvGrpSpPr>
+        <p:cNvPr id="1" name=""/>
+        <p:cNvGrpSpPr/>
+        <p:nvPr/>
+      </p:nvGrpSpPr>
+      <p:grpSpPr>
+        <a:xfrm>
+          <a:off x="0" y="0"/>
+          <a:ext cx="0" cy="0"/>
+          <a:chOff x="0" y="0"/>
+          <a:chExt cx="0" cy="0"/>
+        </a:xfrm>
+      </p:grpSpPr>
+      <p:sp>
+        <p:nvSpPr>
+          <p:cNvPr id="2" name="Folienbildplatzhalter 1"/>
+          <p:cNvSpPr>
+            <a:spLocks noGrp="1" noRot="1" noChangeAspect="1"/>
+          </p:cNvSpPr>
+          <p:nvPr>
+            <p:ph type="sldImg"/>
+          </p:nvPr>
+        </p:nvSpPr>
+        <p:spPr/>
+      </p:sp>
+      <p:sp>
+        <p:nvSpPr>
+          <p:cNvPr id="3" name="Notizenplatzhalter 2"/>
+          <p:cNvSpPr>
+            <a:spLocks noGrp="1"/>
+          </p:cNvSpPr>
+          <p:nvPr>
+            <p:ph type="body" idx="1"/>
+          </p:nvPr>
+        </p:nvSpPr>
+        <p:spPr/>
+        <p:txBody>
+          <a:bodyPr/>
+          <a:lstStyle/>
+          <a:p>
+            <a:r>
+              <a:rPr lang="de-CH" dirty="0" smtClean="0"/>
+              <a:t>Demo zeigen</a:t>
+            </a:r>
+            <a:endParaRPr lang="de-CH" dirty="0"/>
+          </a:p>
+        </p:txBody>
+      </p:sp>
+      <p:sp>
+        <p:nvSpPr>
+          <p:cNvPr id="4" name="Foliennummernplatzhalter 3"/>
+          <p:cNvSpPr>
+            <a:spLocks noGrp="1"/>
+          </p:cNvSpPr>
+          <p:nvPr>
+            <p:ph type="sldNum" sz="quarter" idx="10"/>
+          </p:nvPr>
+        </p:nvSpPr>
+        <p:spPr/>
+        <p:txBody>
+          <a:bodyPr/>
+          <a:lstStyle/>
+          <a:p>
+            <a:fld id="{2757A091-AEE2-4DA2-90B8-7B6B6A595E0D}" type="slidenum">
+              <a:rPr lang="de-CH" smtClean="0"/>
               <a:t>11</a:t>
             </a:fld>
             <a:endParaRPr lang="de-CH"/>
@@ -657,6 +841,553 @@
     <p:extLst>
       <p:ext uri="{BB962C8B-B14F-4D97-AF65-F5344CB8AC3E}">
         <p14:creationId xmlns:p14="http://schemas.microsoft.com/office/powerpoint/2010/main" val="2311298544"/>
+      </p:ext>
+    </p:extLst>
+  </p:cSld>
+  <p:clrMapOvr>
+    <a:masterClrMapping/>
+  </p:clrMapOvr>
+</p:notes>
+</file>
+
+<file path=ppt/notesSlides/notesSlide4.xml><?xml version="1.0" encoding="utf-8"?>
+<p:notes xmlns:a="http://schemas.openxmlformats.org/drawingml/2006/main" xmlns:r="http://schemas.openxmlformats.org/officeDocument/2006/relationships" xmlns:p="http://schemas.openxmlformats.org/presentationml/2006/main">
+  <p:cSld>
+    <p:spTree>
+      <p:nvGrpSpPr>
+        <p:cNvPr id="1" name=""/>
+        <p:cNvGrpSpPr/>
+        <p:nvPr/>
+      </p:nvGrpSpPr>
+      <p:grpSpPr>
+        <a:xfrm>
+          <a:off x="0" y="0"/>
+          <a:ext cx="0" cy="0"/>
+          <a:chOff x="0" y="0"/>
+          <a:chExt cx="0" cy="0"/>
+        </a:xfrm>
+      </p:grpSpPr>
+      <p:sp>
+        <p:nvSpPr>
+          <p:cNvPr id="2" name="Folienbildplatzhalter 1"/>
+          <p:cNvSpPr>
+            <a:spLocks noGrp="1" noRot="1" noChangeAspect="1"/>
+          </p:cNvSpPr>
+          <p:nvPr>
+            <p:ph type="sldImg"/>
+          </p:nvPr>
+        </p:nvSpPr>
+        <p:spPr/>
+      </p:sp>
+      <p:sp>
+        <p:nvSpPr>
+          <p:cNvPr id="3" name="Notizenplatzhalter 2"/>
+          <p:cNvSpPr>
+            <a:spLocks noGrp="1"/>
+          </p:cNvSpPr>
+          <p:nvPr>
+            <p:ph type="body" idx="1"/>
+          </p:nvPr>
+        </p:nvSpPr>
+        <p:spPr/>
+        <p:txBody>
+          <a:bodyPr/>
+          <a:lstStyle/>
+          <a:p>
+            <a:r>
+              <a:rPr lang="de-CH" dirty="0" smtClean="0"/>
+              <a:t>css_selectors.html</a:t>
+            </a:r>
+            <a:endParaRPr lang="de-CH" dirty="0"/>
+          </a:p>
+        </p:txBody>
+      </p:sp>
+      <p:sp>
+        <p:nvSpPr>
+          <p:cNvPr id="4" name="Foliennummernplatzhalter 3"/>
+          <p:cNvSpPr>
+            <a:spLocks noGrp="1"/>
+          </p:cNvSpPr>
+          <p:nvPr>
+            <p:ph type="sldNum" sz="quarter" idx="10"/>
+          </p:nvPr>
+        </p:nvSpPr>
+        <p:spPr/>
+        <p:txBody>
+          <a:bodyPr/>
+          <a:lstStyle/>
+          <a:p>
+            <a:fld id="{2757A091-AEE2-4DA2-90B8-7B6B6A595E0D}" type="slidenum">
+              <a:rPr lang="de-CH" smtClean="0"/>
+              <a:t>15</a:t>
+            </a:fld>
+            <a:endParaRPr lang="de-CH"/>
+          </a:p>
+        </p:txBody>
+      </p:sp>
+    </p:spTree>
+    <p:extLst>
+      <p:ext uri="{BB962C8B-B14F-4D97-AF65-F5344CB8AC3E}">
+        <p14:creationId xmlns:p14="http://schemas.microsoft.com/office/powerpoint/2010/main" val="2106035093"/>
+      </p:ext>
+    </p:extLst>
+  </p:cSld>
+  <p:clrMapOvr>
+    <a:masterClrMapping/>
+  </p:clrMapOvr>
+</p:notes>
+</file>
+
+<file path=ppt/notesSlides/notesSlide5.xml><?xml version="1.0" encoding="utf-8"?>
+<p:notes xmlns:a="http://schemas.openxmlformats.org/drawingml/2006/main" xmlns:r="http://schemas.openxmlformats.org/officeDocument/2006/relationships" xmlns:p="http://schemas.openxmlformats.org/presentationml/2006/main">
+  <p:cSld>
+    <p:spTree>
+      <p:nvGrpSpPr>
+        <p:cNvPr id="1" name=""/>
+        <p:cNvGrpSpPr/>
+        <p:nvPr/>
+      </p:nvGrpSpPr>
+      <p:grpSpPr>
+        <a:xfrm>
+          <a:off x="0" y="0"/>
+          <a:ext cx="0" cy="0"/>
+          <a:chOff x="0" y="0"/>
+          <a:chExt cx="0" cy="0"/>
+        </a:xfrm>
+      </p:grpSpPr>
+      <p:sp>
+        <p:nvSpPr>
+          <p:cNvPr id="2" name="Folienbildplatzhalter 1"/>
+          <p:cNvSpPr>
+            <a:spLocks noGrp="1" noRot="1" noChangeAspect="1"/>
+          </p:cNvSpPr>
+          <p:nvPr>
+            <p:ph type="sldImg"/>
+          </p:nvPr>
+        </p:nvSpPr>
+        <p:spPr/>
+      </p:sp>
+      <p:sp>
+        <p:nvSpPr>
+          <p:cNvPr id="3" name="Notizenplatzhalter 2"/>
+          <p:cNvSpPr>
+            <a:spLocks noGrp="1"/>
+          </p:cNvSpPr>
+          <p:nvPr>
+            <p:ph type="body" idx="1"/>
+          </p:nvPr>
+        </p:nvSpPr>
+        <p:spPr/>
+        <p:txBody>
+          <a:bodyPr/>
+          <a:lstStyle/>
+          <a:p>
+            <a:r>
+              <a:rPr lang="de-CH" dirty="0" smtClean="0"/>
+              <a:t>css_inheritance.html</a:t>
+            </a:r>
+            <a:endParaRPr lang="de-CH" dirty="0"/>
+          </a:p>
+        </p:txBody>
+      </p:sp>
+      <p:sp>
+        <p:nvSpPr>
+          <p:cNvPr id="4" name="Foliennummernplatzhalter 3"/>
+          <p:cNvSpPr>
+            <a:spLocks noGrp="1"/>
+          </p:cNvSpPr>
+          <p:nvPr>
+            <p:ph type="sldNum" sz="quarter" idx="10"/>
+          </p:nvPr>
+        </p:nvSpPr>
+        <p:spPr/>
+        <p:txBody>
+          <a:bodyPr/>
+          <a:lstStyle/>
+          <a:p>
+            <a:fld id="{2757A091-AEE2-4DA2-90B8-7B6B6A595E0D}" type="slidenum">
+              <a:rPr lang="de-CH" smtClean="0"/>
+              <a:t>16</a:t>
+            </a:fld>
+            <a:endParaRPr lang="de-CH"/>
+          </a:p>
+        </p:txBody>
+      </p:sp>
+    </p:spTree>
+    <p:extLst>
+      <p:ext uri="{BB962C8B-B14F-4D97-AF65-F5344CB8AC3E}">
+        <p14:creationId xmlns:p14="http://schemas.microsoft.com/office/powerpoint/2010/main" val="2985553332"/>
+      </p:ext>
+    </p:extLst>
+  </p:cSld>
+  <p:clrMapOvr>
+    <a:masterClrMapping/>
+  </p:clrMapOvr>
+</p:notes>
+</file>
+
+<file path=ppt/notesSlides/notesSlide6.xml><?xml version="1.0" encoding="utf-8"?>
+<p:notes xmlns:a="http://schemas.openxmlformats.org/drawingml/2006/main" xmlns:r="http://schemas.openxmlformats.org/officeDocument/2006/relationships" xmlns:p="http://schemas.openxmlformats.org/presentationml/2006/main">
+  <p:cSld>
+    <p:spTree>
+      <p:nvGrpSpPr>
+        <p:cNvPr id="1" name=""/>
+        <p:cNvGrpSpPr/>
+        <p:nvPr/>
+      </p:nvGrpSpPr>
+      <p:grpSpPr>
+        <a:xfrm>
+          <a:off x="0" y="0"/>
+          <a:ext cx="0" cy="0"/>
+          <a:chOff x="0" y="0"/>
+          <a:chExt cx="0" cy="0"/>
+        </a:xfrm>
+      </p:grpSpPr>
+      <p:sp>
+        <p:nvSpPr>
+          <p:cNvPr id="2" name="Folienbildplatzhalter 1"/>
+          <p:cNvSpPr>
+            <a:spLocks noGrp="1" noRot="1" noChangeAspect="1"/>
+          </p:cNvSpPr>
+          <p:nvPr>
+            <p:ph type="sldImg"/>
+          </p:nvPr>
+        </p:nvSpPr>
+        <p:spPr/>
+      </p:sp>
+      <p:sp>
+        <p:nvSpPr>
+          <p:cNvPr id="3" name="Notizenplatzhalter 2"/>
+          <p:cNvSpPr>
+            <a:spLocks noGrp="1"/>
+          </p:cNvSpPr>
+          <p:nvPr>
+            <p:ph type="body" idx="1"/>
+          </p:nvPr>
+        </p:nvSpPr>
+        <p:spPr/>
+        <p:txBody>
+          <a:bodyPr/>
+          <a:lstStyle/>
+          <a:p>
+            <a:r>
+              <a:rPr lang="de-CH" dirty="0" smtClean="0"/>
+              <a:t>css_dimension.html</a:t>
+            </a:r>
+            <a:endParaRPr lang="de-CH" dirty="0"/>
+          </a:p>
+        </p:txBody>
+      </p:sp>
+      <p:sp>
+        <p:nvSpPr>
+          <p:cNvPr id="4" name="Foliennummernplatzhalter 3"/>
+          <p:cNvSpPr>
+            <a:spLocks noGrp="1"/>
+          </p:cNvSpPr>
+          <p:nvPr>
+            <p:ph type="sldNum" sz="quarter" idx="10"/>
+          </p:nvPr>
+        </p:nvSpPr>
+        <p:spPr/>
+        <p:txBody>
+          <a:bodyPr/>
+          <a:lstStyle/>
+          <a:p>
+            <a:fld id="{2757A091-AEE2-4DA2-90B8-7B6B6A595E0D}" type="slidenum">
+              <a:rPr lang="de-CH" smtClean="0"/>
+              <a:t>19</a:t>
+            </a:fld>
+            <a:endParaRPr lang="de-CH"/>
+          </a:p>
+        </p:txBody>
+      </p:sp>
+    </p:spTree>
+    <p:extLst>
+      <p:ext uri="{BB962C8B-B14F-4D97-AF65-F5344CB8AC3E}">
+        <p14:creationId xmlns:p14="http://schemas.microsoft.com/office/powerpoint/2010/main" val="1801404561"/>
+      </p:ext>
+    </p:extLst>
+  </p:cSld>
+  <p:clrMapOvr>
+    <a:masterClrMapping/>
+  </p:clrMapOvr>
+</p:notes>
+</file>
+
+<file path=ppt/notesSlides/notesSlide7.xml><?xml version="1.0" encoding="utf-8"?>
+<p:notes xmlns:a="http://schemas.openxmlformats.org/drawingml/2006/main" xmlns:r="http://schemas.openxmlformats.org/officeDocument/2006/relationships" xmlns:p="http://schemas.openxmlformats.org/presentationml/2006/main">
+  <p:cSld>
+    <p:spTree>
+      <p:nvGrpSpPr>
+        <p:cNvPr id="1" name=""/>
+        <p:cNvGrpSpPr/>
+        <p:nvPr/>
+      </p:nvGrpSpPr>
+      <p:grpSpPr>
+        <a:xfrm>
+          <a:off x="0" y="0"/>
+          <a:ext cx="0" cy="0"/>
+          <a:chOff x="0" y="0"/>
+          <a:chExt cx="0" cy="0"/>
+        </a:xfrm>
+      </p:grpSpPr>
+      <p:sp>
+        <p:nvSpPr>
+          <p:cNvPr id="2" name="Folienbildplatzhalter 1"/>
+          <p:cNvSpPr>
+            <a:spLocks noGrp="1" noRot="1" noChangeAspect="1"/>
+          </p:cNvSpPr>
+          <p:nvPr>
+            <p:ph type="sldImg"/>
+          </p:nvPr>
+        </p:nvSpPr>
+        <p:spPr/>
+      </p:sp>
+      <p:sp>
+        <p:nvSpPr>
+          <p:cNvPr id="3" name="Notizenplatzhalter 2"/>
+          <p:cNvSpPr>
+            <a:spLocks noGrp="1"/>
+          </p:cNvSpPr>
+          <p:nvPr>
+            <p:ph type="body" idx="1"/>
+          </p:nvPr>
+        </p:nvSpPr>
+        <p:spPr/>
+        <p:txBody>
+          <a:bodyPr/>
+          <a:lstStyle/>
+          <a:p>
+            <a:r>
+              <a:rPr lang="de-CH" dirty="0" smtClean="0"/>
+              <a:t>css_boxmodel.html</a:t>
+            </a:r>
+            <a:endParaRPr lang="de-CH" dirty="0"/>
+          </a:p>
+        </p:txBody>
+      </p:sp>
+      <p:sp>
+        <p:nvSpPr>
+          <p:cNvPr id="4" name="Foliennummernplatzhalter 3"/>
+          <p:cNvSpPr>
+            <a:spLocks noGrp="1"/>
+          </p:cNvSpPr>
+          <p:nvPr>
+            <p:ph type="sldNum" sz="quarter" idx="10"/>
+          </p:nvPr>
+        </p:nvSpPr>
+        <p:spPr/>
+        <p:txBody>
+          <a:bodyPr/>
+          <a:lstStyle/>
+          <a:p>
+            <a:fld id="{2757A091-AEE2-4DA2-90B8-7B6B6A595E0D}" type="slidenum">
+              <a:rPr lang="de-CH" smtClean="0"/>
+              <a:t>20</a:t>
+            </a:fld>
+            <a:endParaRPr lang="de-CH"/>
+          </a:p>
+        </p:txBody>
+      </p:sp>
+    </p:spTree>
+    <p:extLst>
+      <p:ext uri="{BB962C8B-B14F-4D97-AF65-F5344CB8AC3E}">
+        <p14:creationId xmlns:p14="http://schemas.microsoft.com/office/powerpoint/2010/main" val="114789478"/>
+      </p:ext>
+    </p:extLst>
+  </p:cSld>
+  <p:clrMapOvr>
+    <a:masterClrMapping/>
+  </p:clrMapOvr>
+</p:notes>
+</file>
+
+<file path=ppt/notesSlides/notesSlide8.xml><?xml version="1.0" encoding="utf-8"?>
+<p:notes xmlns:a="http://schemas.openxmlformats.org/drawingml/2006/main" xmlns:r="http://schemas.openxmlformats.org/officeDocument/2006/relationships" xmlns:p="http://schemas.openxmlformats.org/presentationml/2006/main">
+  <p:cSld>
+    <p:spTree>
+      <p:nvGrpSpPr>
+        <p:cNvPr id="1" name=""/>
+        <p:cNvGrpSpPr/>
+        <p:nvPr/>
+      </p:nvGrpSpPr>
+      <p:grpSpPr>
+        <a:xfrm>
+          <a:off x="0" y="0"/>
+          <a:ext cx="0" cy="0"/>
+          <a:chOff x="0" y="0"/>
+          <a:chExt cx="0" cy="0"/>
+        </a:xfrm>
+      </p:grpSpPr>
+      <p:sp>
+        <p:nvSpPr>
+          <p:cNvPr id="2" name="Folienbildplatzhalter 1"/>
+          <p:cNvSpPr>
+            <a:spLocks noGrp="1" noRot="1" noChangeAspect="1"/>
+          </p:cNvSpPr>
+          <p:nvPr>
+            <p:ph type="sldImg"/>
+          </p:nvPr>
+        </p:nvSpPr>
+        <p:spPr/>
+      </p:sp>
+      <p:sp>
+        <p:nvSpPr>
+          <p:cNvPr id="3" name="Notizenplatzhalter 2"/>
+          <p:cNvSpPr>
+            <a:spLocks noGrp="1"/>
+          </p:cNvSpPr>
+          <p:nvPr>
+            <p:ph type="body" idx="1"/>
+          </p:nvPr>
+        </p:nvSpPr>
+        <p:spPr/>
+        <p:txBody>
+          <a:bodyPr/>
+          <a:lstStyle/>
+          <a:p>
+            <a:endParaRPr lang="de-CH" dirty="0"/>
+          </a:p>
+        </p:txBody>
+      </p:sp>
+      <p:sp>
+        <p:nvSpPr>
+          <p:cNvPr id="4" name="Foliennummernplatzhalter 3"/>
+          <p:cNvSpPr>
+            <a:spLocks noGrp="1"/>
+          </p:cNvSpPr>
+          <p:nvPr>
+            <p:ph type="sldNum" sz="quarter" idx="10"/>
+          </p:nvPr>
+        </p:nvSpPr>
+        <p:spPr/>
+        <p:txBody>
+          <a:bodyPr/>
+          <a:lstStyle/>
+          <a:p>
+            <a:fld id="{2757A091-AEE2-4DA2-90B8-7B6B6A595E0D}" type="slidenum">
+              <a:rPr lang="de-CH" smtClean="0"/>
+              <a:t>22</a:t>
+            </a:fld>
+            <a:endParaRPr lang="de-CH"/>
+          </a:p>
+        </p:txBody>
+      </p:sp>
+    </p:spTree>
+    <p:extLst>
+      <p:ext uri="{BB962C8B-B14F-4D97-AF65-F5344CB8AC3E}">
+        <p14:creationId xmlns:p14="http://schemas.microsoft.com/office/powerpoint/2010/main" val="572748408"/>
+      </p:ext>
+    </p:extLst>
+  </p:cSld>
+  <p:clrMapOvr>
+    <a:masterClrMapping/>
+  </p:clrMapOvr>
+</p:notes>
+</file>
+
+<file path=ppt/notesSlides/notesSlide9.xml><?xml version="1.0" encoding="utf-8"?>
+<p:notes xmlns:a="http://schemas.openxmlformats.org/drawingml/2006/main" xmlns:r="http://schemas.openxmlformats.org/officeDocument/2006/relationships" xmlns:p="http://schemas.openxmlformats.org/presentationml/2006/main">
+  <p:cSld>
+    <p:spTree>
+      <p:nvGrpSpPr>
+        <p:cNvPr id="1" name=""/>
+        <p:cNvGrpSpPr/>
+        <p:nvPr/>
+      </p:nvGrpSpPr>
+      <p:grpSpPr>
+        <a:xfrm>
+          <a:off x="0" y="0"/>
+          <a:ext cx="0" cy="0"/>
+          <a:chOff x="0" y="0"/>
+          <a:chExt cx="0" cy="0"/>
+        </a:xfrm>
+      </p:grpSpPr>
+      <p:sp>
+        <p:nvSpPr>
+          <p:cNvPr id="2" name="Folienbildplatzhalter 1"/>
+          <p:cNvSpPr>
+            <a:spLocks noGrp="1" noRot="1" noChangeAspect="1"/>
+          </p:cNvSpPr>
+          <p:nvPr>
+            <p:ph type="sldImg"/>
+          </p:nvPr>
+        </p:nvSpPr>
+        <p:spPr/>
+      </p:sp>
+      <p:sp>
+        <p:nvSpPr>
+          <p:cNvPr id="3" name="Notizenplatzhalter 2"/>
+          <p:cNvSpPr>
+            <a:spLocks noGrp="1"/>
+          </p:cNvSpPr>
+          <p:nvPr>
+            <p:ph type="body" idx="1"/>
+          </p:nvPr>
+        </p:nvSpPr>
+        <p:spPr/>
+        <p:txBody>
+          <a:bodyPr/>
+          <a:lstStyle/>
+          <a:p>
+            <a:r>
+              <a:rPr lang="de-CH" dirty="0" err="1" smtClean="0"/>
+              <a:t>css</a:t>
+            </a:r>
+            <a:r>
+              <a:rPr lang="de-CH" dirty="0" smtClean="0"/>
+              <a:t> </a:t>
+            </a:r>
+            <a:r>
+              <a:rPr lang="de-CH" dirty="0" err="1" smtClean="0"/>
+              <a:t>positioning</a:t>
+            </a:r>
+            <a:r>
+              <a:rPr lang="de-CH" baseline="0" dirty="0" smtClean="0"/>
+              <a:t> </a:t>
+            </a:r>
+            <a:r>
+              <a:rPr lang="de-CH" baseline="0" dirty="0" err="1" smtClean="0"/>
+              <a:t>demo</a:t>
+            </a:r>
+            <a:endParaRPr lang="de-CH" baseline="0" dirty="0" smtClean="0"/>
+          </a:p>
+          <a:p>
+            <a:r>
+              <a:rPr lang="de-CH" baseline="0" dirty="0" smtClean="0"/>
+              <a:t>css_positioning.html</a:t>
+            </a:r>
+            <a:endParaRPr lang="de-CH" dirty="0"/>
+          </a:p>
+        </p:txBody>
+      </p:sp>
+      <p:sp>
+        <p:nvSpPr>
+          <p:cNvPr id="4" name="Foliennummernplatzhalter 3"/>
+          <p:cNvSpPr>
+            <a:spLocks noGrp="1"/>
+          </p:cNvSpPr>
+          <p:nvPr>
+            <p:ph type="sldNum" sz="quarter" idx="10"/>
+          </p:nvPr>
+        </p:nvSpPr>
+        <p:spPr/>
+        <p:txBody>
+          <a:bodyPr/>
+          <a:lstStyle/>
+          <a:p>
+            <a:fld id="{2757A091-AEE2-4DA2-90B8-7B6B6A595E0D}" type="slidenum">
+              <a:rPr lang="de-CH" smtClean="0"/>
+              <a:t>23</a:t>
+            </a:fld>
+            <a:endParaRPr lang="de-CH"/>
+          </a:p>
+        </p:txBody>
+      </p:sp>
+    </p:spTree>
+    <p:extLst>
+      <p:ext uri="{BB962C8B-B14F-4D97-AF65-F5344CB8AC3E}">
+        <p14:creationId xmlns:p14="http://schemas.microsoft.com/office/powerpoint/2010/main" val="3459614242"/>
       </p:ext>
     </p:extLst>
   </p:cSld>
@@ -892,7 +1623,7 @@
           <a:p>
             <a:fld id="{18B6C74E-B752-46C0-9CA8-3BFAC7AE4FEA}" type="datetimeFigureOut">
               <a:rPr lang="de-CH" smtClean="0"/>
-              <a:t>18.03.2015</a:t>
+              <a:t>08.04.2015</a:t>
             </a:fld>
             <a:endParaRPr lang="de-CH"/>
           </a:p>
@@ -1100,7 +1831,7 @@
           <a:p>
             <a:fld id="{18B6C74E-B752-46C0-9CA8-3BFAC7AE4FEA}" type="datetimeFigureOut">
               <a:rPr lang="de-CH" smtClean="0"/>
-              <a:t>18.03.2015</a:t>
+              <a:t>08.04.2015</a:t>
             </a:fld>
             <a:endParaRPr lang="de-CH"/>
           </a:p>
@@ -1356,7 +2087,7 @@
           <a:p>
             <a:fld id="{18B6C74E-B752-46C0-9CA8-3BFAC7AE4FEA}" type="datetimeFigureOut">
               <a:rPr lang="de-CH" smtClean="0"/>
-              <a:t>18.03.2015</a:t>
+              <a:t>08.04.2015</a:t>
             </a:fld>
             <a:endParaRPr lang="de-CH"/>
           </a:p>
@@ -1530,7 +2261,7 @@
           <a:p>
             <a:fld id="{18B6C74E-B752-46C0-9CA8-3BFAC7AE4FEA}" type="datetimeFigureOut">
               <a:rPr lang="de-CH" smtClean="0"/>
-              <a:t>18.03.2015</a:t>
+              <a:t>08.04.2015</a:t>
             </a:fld>
             <a:endParaRPr lang="de-CH"/>
           </a:p>
@@ -1873,7 +2604,7 @@
           <a:p>
             <a:fld id="{18B6C74E-B752-46C0-9CA8-3BFAC7AE4FEA}" type="datetimeFigureOut">
               <a:rPr lang="de-CH" smtClean="0"/>
-              <a:t>18.03.2015</a:t>
+              <a:t>08.04.2015</a:t>
             </a:fld>
             <a:endParaRPr lang="de-CH"/>
           </a:p>
@@ -2148,7 +2879,7 @@
           <a:p>
             <a:fld id="{18B6C74E-B752-46C0-9CA8-3BFAC7AE4FEA}" type="datetimeFigureOut">
               <a:rPr lang="de-CH" smtClean="0"/>
-              <a:t>18.03.2015</a:t>
+              <a:t>08.04.2015</a:t>
             </a:fld>
             <a:endParaRPr lang="de-CH"/>
           </a:p>
@@ -2527,7 +3258,7 @@
           <a:p>
             <a:fld id="{18B6C74E-B752-46C0-9CA8-3BFAC7AE4FEA}" type="datetimeFigureOut">
               <a:rPr lang="de-CH" smtClean="0"/>
-              <a:t>18.03.2015</a:t>
+              <a:t>08.04.2015</a:t>
             </a:fld>
             <a:endParaRPr lang="de-CH"/>
           </a:p>
@@ -2645,7 +3376,7 @@
           <a:p>
             <a:fld id="{18B6C74E-B752-46C0-9CA8-3BFAC7AE4FEA}" type="datetimeFigureOut">
               <a:rPr lang="de-CH" smtClean="0"/>
-              <a:t>18.03.2015</a:t>
+              <a:t>08.04.2015</a:t>
             </a:fld>
             <a:endParaRPr lang="de-CH"/>
           </a:p>
@@ -2816,7 +3547,7 @@
           <a:p>
             <a:fld id="{18B6C74E-B752-46C0-9CA8-3BFAC7AE4FEA}" type="datetimeFigureOut">
               <a:rPr lang="de-CH" smtClean="0"/>
-              <a:t>18.03.2015</a:t>
+              <a:t>08.04.2015</a:t>
             </a:fld>
             <a:endParaRPr lang="de-CH"/>
           </a:p>
@@ -3170,7 +3901,7 @@
           <a:p>
             <a:fld id="{18B6C74E-B752-46C0-9CA8-3BFAC7AE4FEA}" type="datetimeFigureOut">
               <a:rPr lang="de-CH" smtClean="0"/>
-              <a:t>18.03.2015</a:t>
+              <a:t>08.04.2015</a:t>
             </a:fld>
             <a:endParaRPr lang="de-CH"/>
           </a:p>
@@ -3552,7 +4283,7 @@
           <a:p>
             <a:fld id="{18B6C74E-B752-46C0-9CA8-3BFAC7AE4FEA}" type="datetimeFigureOut">
               <a:rPr lang="de-CH" smtClean="0"/>
-              <a:t>18.03.2015</a:t>
+              <a:t>08.04.2015</a:t>
             </a:fld>
             <a:endParaRPr lang="de-CH"/>
           </a:p>
@@ -3839,7 +4570,7 @@
           <a:p>
             <a:fld id="{18B6C74E-B752-46C0-9CA8-3BFAC7AE4FEA}" type="datetimeFigureOut">
               <a:rPr lang="de-CH" smtClean="0"/>
-              <a:t>18.03.2015</a:t>
+              <a:t>08.04.2015</a:t>
             </a:fld>
             <a:endParaRPr lang="de-CH"/>
           </a:p>
@@ -4506,11 +5237,7 @@
             </a:pPr>
             <a:r>
               <a:rPr lang="de-CH" dirty="0" smtClean="0"/>
-              <a:t>Der </a:t>
-            </a:r>
-            <a:r>
-              <a:rPr lang="de-CH" dirty="0" smtClean="0"/>
-              <a:t>Code</a:t>
+              <a:t>Der Code</a:t>
             </a:r>
           </a:p>
           <a:p>
@@ -14023,7 +14750,7 @@
         </p:nvSpPr>
         <p:spPr>
           <a:xfrm>
-            <a:off x="838200" y="1615039"/>
+            <a:off x="838200" y="1889675"/>
             <a:ext cx="6051657" cy="369332"/>
           </a:xfrm>
           <a:prstGeom prst="rect">
@@ -14541,7 +15268,7 @@
         </p:nvSpPr>
         <p:spPr>
           <a:xfrm>
-            <a:off x="838200" y="1357318"/>
+            <a:off x="838200" y="1795468"/>
             <a:ext cx="3727302" cy="1477328"/>
           </a:xfrm>
           <a:prstGeom prst="rect">
@@ -15161,6 +15888,494 @@
           <a:p>
             <a:r>
               <a:rPr lang="de-CH" dirty="0" smtClean="0"/>
+              <a:t>Block und Inline</a:t>
+            </a:r>
+            <a:endParaRPr lang="de-CH" dirty="0"/>
+          </a:p>
+        </p:txBody>
+      </p:sp>
+      <p:sp>
+        <p:nvSpPr>
+          <p:cNvPr id="4" name="Rechteck 3"/>
+          <p:cNvSpPr/>
+          <p:nvPr/>
+        </p:nvSpPr>
+        <p:spPr>
+          <a:xfrm>
+            <a:off x="1097280" y="2941043"/>
+            <a:ext cx="3212739" cy="369332"/>
+          </a:xfrm>
+          <a:prstGeom prst="rect">
+            <a:avLst/>
+          </a:prstGeom>
+        </p:spPr>
+        <p:txBody>
+          <a:bodyPr wrap="none">
+            <a:spAutoFit/>
+          </a:bodyPr>
+          <a:lstStyle/>
+          <a:p>
+            <a:r>
+              <a:rPr lang="de-CH" dirty="0">
+                <a:solidFill>
+                  <a:srgbClr val="0000FF"/>
+                </a:solidFill>
+                <a:latin typeface="Batang" panose="02030600000101010101" pitchFamily="18" charset="-127"/>
+                <a:ea typeface="Batang" panose="02030600000101010101" pitchFamily="18" charset="-127"/>
+              </a:rPr>
+              <a:t>div </a:t>
+            </a:r>
+            <a:r>
+              <a:rPr lang="de-CH" b="1" dirty="0">
+                <a:solidFill>
+                  <a:srgbClr val="000000"/>
+                </a:solidFill>
+                <a:latin typeface="Courier New" panose="02070309020205020404" pitchFamily="49" charset="0"/>
+              </a:rPr>
+              <a:t>{</a:t>
+            </a:r>
+            <a:r>
+              <a:rPr lang="de-CH" b="1" dirty="0">
+                <a:solidFill>
+                  <a:srgbClr val="8080C0"/>
+                </a:solidFill>
+                <a:latin typeface="Courier New" panose="02070309020205020404" pitchFamily="49" charset="0"/>
+              </a:rPr>
+              <a:t> </a:t>
+            </a:r>
+            <a:r>
+              <a:rPr lang="de-CH" b="1" dirty="0" err="1">
+                <a:solidFill>
+                  <a:srgbClr val="8080C0"/>
+                </a:solidFill>
+                <a:latin typeface="Courier New" panose="02070309020205020404" pitchFamily="49" charset="0"/>
+              </a:rPr>
+              <a:t>display</a:t>
+            </a:r>
+            <a:r>
+              <a:rPr lang="de-CH" b="1" dirty="0">
+                <a:solidFill>
+                  <a:srgbClr val="000000"/>
+                </a:solidFill>
+                <a:latin typeface="Courier New" panose="02070309020205020404" pitchFamily="49" charset="0"/>
+              </a:rPr>
+              <a:t>: block;</a:t>
+            </a:r>
+            <a:r>
+              <a:rPr lang="de-CH" b="1" dirty="0">
+                <a:solidFill>
+                  <a:srgbClr val="8080C0"/>
+                </a:solidFill>
+                <a:latin typeface="Courier New" panose="02070309020205020404" pitchFamily="49" charset="0"/>
+              </a:rPr>
+              <a:t> </a:t>
+            </a:r>
+            <a:r>
+              <a:rPr lang="de-CH" b="1" dirty="0">
+                <a:solidFill>
+                  <a:srgbClr val="000000"/>
+                </a:solidFill>
+                <a:latin typeface="Courier New" panose="02070309020205020404" pitchFamily="49" charset="0"/>
+              </a:rPr>
+              <a:t>}</a:t>
+            </a:r>
+            <a:endParaRPr lang="de-CH" dirty="0">
+              <a:effectLst/>
+            </a:endParaRPr>
+          </a:p>
+        </p:txBody>
+      </p:sp>
+      <p:sp>
+        <p:nvSpPr>
+          <p:cNvPr id="5" name="Rechteck 4"/>
+          <p:cNvSpPr/>
+          <p:nvPr/>
+        </p:nvSpPr>
+        <p:spPr>
+          <a:xfrm>
+            <a:off x="6553200" y="1943100"/>
+            <a:ext cx="4286250" cy="4267200"/>
+          </a:xfrm>
+          <a:prstGeom prst="rect">
+            <a:avLst/>
+          </a:prstGeom>
+          <a:effectLst>
+            <a:outerShdw blurRad="50800" dist="38100" dir="2700000" algn="tl" rotWithShape="0">
+              <a:prstClr val="black">
+                <a:alpha val="40000"/>
+              </a:prstClr>
+            </a:outerShdw>
+          </a:effectLst>
+        </p:spPr>
+        <p:style>
+          <a:lnRef idx="2">
+            <a:schemeClr val="accent1">
+              <a:shade val="50000"/>
+            </a:schemeClr>
+          </a:lnRef>
+          <a:fillRef idx="1">
+            <a:schemeClr val="accent1"/>
+          </a:fillRef>
+          <a:effectRef idx="0">
+            <a:schemeClr val="accent1"/>
+          </a:effectRef>
+          <a:fontRef idx="minor">
+            <a:schemeClr val="lt1"/>
+          </a:fontRef>
+        </p:style>
+        <p:txBody>
+          <a:bodyPr rtlCol="0" anchor="t" anchorCtr="0"/>
+          <a:lstStyle/>
+          <a:p>
+            <a:r>
+              <a:rPr lang="de-CH" dirty="0" err="1" smtClean="0"/>
+              <a:t>body</a:t>
+            </a:r>
+            <a:endParaRPr lang="de-CH" dirty="0"/>
+          </a:p>
+        </p:txBody>
+      </p:sp>
+      <p:sp>
+        <p:nvSpPr>
+          <p:cNvPr id="6" name="Rechteck 5"/>
+          <p:cNvSpPr/>
+          <p:nvPr/>
+        </p:nvSpPr>
+        <p:spPr>
+          <a:xfrm>
+            <a:off x="6783859" y="2483708"/>
+            <a:ext cx="1223319" cy="704335"/>
+          </a:xfrm>
+          <a:prstGeom prst="rect">
+            <a:avLst/>
+          </a:prstGeom>
+        </p:spPr>
+        <p:style>
+          <a:lnRef idx="0">
+            <a:schemeClr val="accent2"/>
+          </a:lnRef>
+          <a:fillRef idx="3">
+            <a:schemeClr val="accent2"/>
+          </a:fillRef>
+          <a:effectRef idx="3">
+            <a:schemeClr val="accent2"/>
+          </a:effectRef>
+          <a:fontRef idx="minor">
+            <a:schemeClr val="lt1"/>
+          </a:fontRef>
+        </p:style>
+        <p:txBody>
+          <a:bodyPr rtlCol="0" anchor="ctr"/>
+          <a:lstStyle/>
+          <a:p>
+            <a:pPr algn="ctr"/>
+            <a:r>
+              <a:rPr lang="de-CH" dirty="0" smtClean="0"/>
+              <a:t>div 1</a:t>
+            </a:r>
+            <a:endParaRPr lang="de-CH" dirty="0"/>
+          </a:p>
+        </p:txBody>
+      </p:sp>
+      <p:sp>
+        <p:nvSpPr>
+          <p:cNvPr id="7" name="Rechteck 6"/>
+          <p:cNvSpPr/>
+          <p:nvPr/>
+        </p:nvSpPr>
+        <p:spPr>
+          <a:xfrm>
+            <a:off x="6783859" y="3393783"/>
+            <a:ext cx="1223319" cy="704335"/>
+          </a:xfrm>
+          <a:prstGeom prst="rect">
+            <a:avLst/>
+          </a:prstGeom>
+        </p:spPr>
+        <p:style>
+          <a:lnRef idx="0">
+            <a:schemeClr val="accent2"/>
+          </a:lnRef>
+          <a:fillRef idx="3">
+            <a:schemeClr val="accent2"/>
+          </a:fillRef>
+          <a:effectRef idx="3">
+            <a:schemeClr val="accent2"/>
+          </a:effectRef>
+          <a:fontRef idx="minor">
+            <a:schemeClr val="lt1"/>
+          </a:fontRef>
+        </p:style>
+        <p:txBody>
+          <a:bodyPr rtlCol="0" anchor="ctr"/>
+          <a:lstStyle/>
+          <a:p>
+            <a:pPr algn="ctr"/>
+            <a:r>
+              <a:rPr lang="de-CH" dirty="0" smtClean="0"/>
+              <a:t>div 2</a:t>
+            </a:r>
+            <a:endParaRPr lang="de-CH" dirty="0"/>
+          </a:p>
+        </p:txBody>
+      </p:sp>
+      <p:sp>
+        <p:nvSpPr>
+          <p:cNvPr id="8" name="Rechteck 7"/>
+          <p:cNvSpPr/>
+          <p:nvPr/>
+        </p:nvSpPr>
+        <p:spPr>
+          <a:xfrm>
+            <a:off x="1082434" y="3913452"/>
+            <a:ext cx="4177747" cy="369332"/>
+          </a:xfrm>
+          <a:prstGeom prst="rect">
+            <a:avLst/>
+          </a:prstGeom>
+        </p:spPr>
+        <p:txBody>
+          <a:bodyPr wrap="none">
+            <a:spAutoFit/>
+          </a:bodyPr>
+          <a:lstStyle/>
+          <a:p>
+            <a:r>
+              <a:rPr lang="de-CH" dirty="0">
+                <a:solidFill>
+                  <a:srgbClr val="0000FF"/>
+                </a:solidFill>
+                <a:latin typeface="Batang" panose="02030600000101010101" pitchFamily="18" charset="-127"/>
+                <a:ea typeface="Batang" panose="02030600000101010101" pitchFamily="18" charset="-127"/>
+              </a:rPr>
+              <a:t>div </a:t>
+            </a:r>
+            <a:r>
+              <a:rPr lang="de-CH" b="1" dirty="0">
+                <a:solidFill>
+                  <a:srgbClr val="000000"/>
+                </a:solidFill>
+                <a:latin typeface="Courier New" panose="02070309020205020404" pitchFamily="49" charset="0"/>
+              </a:rPr>
+              <a:t>{</a:t>
+            </a:r>
+            <a:r>
+              <a:rPr lang="de-CH" b="1" dirty="0">
+                <a:solidFill>
+                  <a:srgbClr val="8080C0"/>
+                </a:solidFill>
+                <a:latin typeface="Courier New" panose="02070309020205020404" pitchFamily="49" charset="0"/>
+              </a:rPr>
+              <a:t> </a:t>
+            </a:r>
+            <a:r>
+              <a:rPr lang="de-CH" b="1" dirty="0" err="1">
+                <a:solidFill>
+                  <a:srgbClr val="8080C0"/>
+                </a:solidFill>
+                <a:latin typeface="Courier New" panose="02070309020205020404" pitchFamily="49" charset="0"/>
+              </a:rPr>
+              <a:t>display</a:t>
+            </a:r>
+            <a:r>
+              <a:rPr lang="de-CH" b="1" dirty="0">
+                <a:solidFill>
+                  <a:srgbClr val="000000"/>
+                </a:solidFill>
+                <a:latin typeface="Courier New" panose="02070309020205020404" pitchFamily="49" charset="0"/>
+              </a:rPr>
+              <a:t>: inline-block;</a:t>
+            </a:r>
+            <a:r>
+              <a:rPr lang="de-CH" b="1" dirty="0">
+                <a:solidFill>
+                  <a:srgbClr val="8080C0"/>
+                </a:solidFill>
+                <a:latin typeface="Courier New" panose="02070309020205020404" pitchFamily="49" charset="0"/>
+              </a:rPr>
+              <a:t> </a:t>
+            </a:r>
+            <a:r>
+              <a:rPr lang="de-CH" b="1" dirty="0">
+                <a:solidFill>
+                  <a:srgbClr val="000000"/>
+                </a:solidFill>
+                <a:latin typeface="Courier New" panose="02070309020205020404" pitchFamily="49" charset="0"/>
+              </a:rPr>
+              <a:t>}</a:t>
+            </a:r>
+            <a:endParaRPr lang="de-CH" dirty="0">
+              <a:effectLst/>
+            </a:endParaRPr>
+          </a:p>
+        </p:txBody>
+      </p:sp>
+    </p:spTree>
+    <p:extLst>
+      <p:ext uri="{BB962C8B-B14F-4D97-AF65-F5344CB8AC3E}">
+        <p14:creationId xmlns:p14="http://schemas.microsoft.com/office/powerpoint/2010/main" val="2713068344"/>
+      </p:ext>
+    </p:extLst>
+  </p:cSld>
+  <p:clrMapOvr>
+    <a:masterClrMapping/>
+  </p:clrMapOvr>
+  <p:timing>
+    <p:tnLst>
+      <p:par>
+        <p:cTn id="1" dur="indefinite" restart="never" nodeType="tmRoot">
+          <p:childTnLst>
+            <p:seq concurrent="1" nextAc="seek">
+              <p:cTn id="2" dur="indefinite" nodeType="mainSeq">
+                <p:childTnLst>
+                  <p:par>
+                    <p:cTn id="3" fill="hold">
+                      <p:stCondLst>
+                        <p:cond delay="indefinite"/>
+                      </p:stCondLst>
+                      <p:childTnLst>
+                        <p:par>
+                          <p:cTn id="4" fill="hold">
+                            <p:stCondLst>
+                              <p:cond delay="0"/>
+                            </p:stCondLst>
+                            <p:childTnLst>
+                              <p:par>
+                                <p:cTn id="5" presetID="1" presetClass="entr" presetSubtype="0" fill="hold" grpId="0" nodeType="clickEffect">
+                                  <p:stCondLst>
+                                    <p:cond delay="0"/>
+                                  </p:stCondLst>
+                                  <p:childTnLst>
+                                    <p:set>
+                                      <p:cBhvr>
+                                        <p:cTn id="6" dur="1" fill="hold">
+                                          <p:stCondLst>
+                                            <p:cond delay="0"/>
+                                          </p:stCondLst>
+                                        </p:cTn>
+                                        <p:tgtEl>
+                                          <p:spTgt spid="8"/>
+                                        </p:tgtEl>
+                                        <p:attrNameLst>
+                                          <p:attrName>style.visibility</p:attrName>
+                                        </p:attrNameLst>
+                                      </p:cBhvr>
+                                      <p:to>
+                                        <p:strVal val="visible"/>
+                                      </p:to>
+                                    </p:set>
+                                  </p:childTnLst>
+                                </p:cTn>
+                              </p:par>
+                            </p:childTnLst>
+                          </p:cTn>
+                        </p:par>
+                      </p:childTnLst>
+                    </p:cTn>
+                  </p:par>
+                  <p:par>
+                    <p:cTn id="7" fill="hold">
+                      <p:stCondLst>
+                        <p:cond delay="indefinite"/>
+                      </p:stCondLst>
+                      <p:childTnLst>
+                        <p:par>
+                          <p:cTn id="8" fill="hold">
+                            <p:stCondLst>
+                              <p:cond delay="0"/>
+                            </p:stCondLst>
+                            <p:childTnLst>
+                              <p:par>
+                                <p:cTn id="9" presetID="43" presetClass="path" presetSubtype="0" accel="50000" decel="50000" fill="hold" grpId="0" nodeType="clickEffect">
+                                  <p:stCondLst>
+                                    <p:cond delay="0"/>
+                                  </p:stCondLst>
+                                  <p:childTnLst>
+                                    <p:animMotion origin="layout" path="M -4.16667E-7 -4.81481E-6 L 0.05586 -4.81481E-6 C 0.08099 -4.81481E-6 0.11211 -0.03657 0.11211 -0.06597 L 0.11211 -0.13171 " pathEditMode="relative" rAng="0" ptsTypes="AAAA">
+                                      <p:cBhvr>
+                                        <p:cTn id="10" dur="2000" fill="hold"/>
+                                        <p:tgtEl>
+                                          <p:spTgt spid="7"/>
+                                        </p:tgtEl>
+                                        <p:attrNameLst>
+                                          <p:attrName>ppt_x</p:attrName>
+                                          <p:attrName>ppt_y</p:attrName>
+                                        </p:attrNameLst>
+                                      </p:cBhvr>
+                                      <p:rCtr x="5599" y="-6597"/>
+                                    </p:animMotion>
+                                  </p:childTnLst>
+                                </p:cTn>
+                              </p:par>
+                            </p:childTnLst>
+                          </p:cTn>
+                        </p:par>
+                      </p:childTnLst>
+                    </p:cTn>
+                  </p:par>
+                </p:childTnLst>
+              </p:cTn>
+              <p:prevCondLst>
+                <p:cond evt="onPrev" delay="0">
+                  <p:tgtEl>
+                    <p:sldTgt/>
+                  </p:tgtEl>
+                </p:cond>
+              </p:prevCondLst>
+              <p:nextCondLst>
+                <p:cond evt="onNext" delay="0">
+                  <p:tgtEl>
+                    <p:sldTgt/>
+                  </p:tgtEl>
+                </p:cond>
+              </p:nextCondLst>
+            </p:seq>
+          </p:childTnLst>
+        </p:cTn>
+      </p:par>
+    </p:tnLst>
+    <p:bldLst>
+      <p:bldP spid="7" grpId="0" animBg="1"/>
+      <p:bldP spid="8" grpId="0"/>
+    </p:bldLst>
+  </p:timing>
+</p:sld>
+</file>
+
+<file path=ppt/slides/slide25.xml><?xml version="1.0" encoding="utf-8"?>
+<p:sld xmlns:a="http://schemas.openxmlformats.org/drawingml/2006/main" xmlns:r="http://schemas.openxmlformats.org/officeDocument/2006/relationships" xmlns:p="http://schemas.openxmlformats.org/presentationml/2006/main">
+  <p:cSld>
+    <p:spTree>
+      <p:nvGrpSpPr>
+        <p:cNvPr id="1" name=""/>
+        <p:cNvGrpSpPr/>
+        <p:nvPr/>
+      </p:nvGrpSpPr>
+      <p:grpSpPr>
+        <a:xfrm>
+          <a:off x="0" y="0"/>
+          <a:ext cx="0" cy="0"/>
+          <a:chOff x="0" y="0"/>
+          <a:chExt cx="0" cy="0"/>
+        </a:xfrm>
+      </p:grpSpPr>
+      <p:sp>
+        <p:nvSpPr>
+          <p:cNvPr id="2" name="Titel 1"/>
+          <p:cNvSpPr>
+            <a:spLocks noGrp="1"/>
+          </p:cNvSpPr>
+          <p:nvPr>
+            <p:ph type="title"/>
+          </p:nvPr>
+        </p:nvSpPr>
+        <p:spPr/>
+        <p:txBody>
+          <a:bodyPr/>
+          <a:lstStyle/>
+          <a:p>
+            <a:r>
+              <a:rPr lang="de-CH" dirty="0" smtClean="0"/>
               <a:t>Hintergrund</a:t>
             </a:r>
             <a:endParaRPr lang="de-CH" dirty="0"/>
@@ -16130,7 +17345,7 @@
 </p:sld>
 </file>
 
-<file path=ppt/slides/slide25.xml><?xml version="1.0" encoding="utf-8"?>
+<file path=ppt/slides/slide26.xml><?xml version="1.0" encoding="utf-8"?>
 <p:sld xmlns:a="http://schemas.openxmlformats.org/drawingml/2006/main" xmlns:r="http://schemas.openxmlformats.org/officeDocument/2006/relationships" xmlns:p="http://schemas.openxmlformats.org/presentationml/2006/main">
   <p:cSld>
     <p:spTree>
@@ -16659,7 +17874,7 @@
 </p:sld>
 </file>
 
-<file path=ppt/slides/slide26.xml><?xml version="1.0" encoding="utf-8"?>
+<file path=ppt/slides/slide27.xml><?xml version="1.0" encoding="utf-8"?>
 <p:sld xmlns:a="http://schemas.openxmlformats.org/drawingml/2006/main" xmlns:r="http://schemas.openxmlformats.org/officeDocument/2006/relationships" xmlns:p="http://schemas.openxmlformats.org/presentationml/2006/main">
   <p:cSld>
     <p:spTree>
@@ -21684,26 +22899,6 @@
 </file>
 
 <file path=customXml/item1.xml><?xml version="1.0" encoding="utf-8"?>
-<?mso-contentType ?>
-<FormTemplates xmlns="http://schemas.microsoft.com/sharepoint/v3/contenttype/forms">
-  <Display>DocumentLibraryForm</Display>
-  <Edit>DocumentLibraryForm</Edit>
-  <New>DocumentLibraryForm</New>
-</FormTemplates>
-</file>
-
-<file path=customXml/item2.xml><?xml version="1.0" encoding="utf-8"?>
-<p:properties xmlns:p="http://schemas.microsoft.com/office/2006/metadata/properties" xmlns:xsi="http://www.w3.org/2001/XMLSchema-instance" xmlns:pc="http://schemas.microsoft.com/office/infopath/2007/PartnerControls">
-  <documentManagement>
-    <DocumentType xmlns="B52DB2DB-4C79-421A-B3B5-7B3E39903FAF">Presentation</DocumentType>
-    <Tags xmlns="B52DB2DB-4C79-421A-B3B5-7B3E39903FAF"/>
-    <PublishingExpirationDate xmlns="http://schemas.microsoft.com/sharepoint/v3" xsi:nil="true"/>
-    <PublishingStartDate xmlns="http://schemas.microsoft.com/sharepoint/v3" xsi:nil="true"/>
-  </documentManagement>
-</p:properties>
-</file>
-
-<file path=customXml/item3.xml><?xml version="1.0" encoding="utf-8"?>
 <ct:contentTypeSchema xmlns:ct="http://schemas.microsoft.com/office/2006/metadata/contentType" xmlns:ma="http://schemas.microsoft.com/office/2006/metadata/properties/metaAttributes" ct:_="" ma:_="" ma:contentTypeName="Document" ma:contentTypeID="0x0101007FB88A3DE5BCC14A89FCFBE463D1D90E" ma:contentTypeVersion="1" ma:contentTypeDescription="Create a new document." ma:contentTypeScope="" ma:versionID="4d8f9a178a16463aae8556ecaad61169">
   <xsd:schema xmlns:xsd="http://www.w3.org/2001/XMLSchema" xmlns:xs="http://www.w3.org/2001/XMLSchema" xmlns:p="http://schemas.microsoft.com/office/2006/metadata/properties" xmlns:ns1="http://schemas.microsoft.com/sharepoint/v3" xmlns:ns2="B52DB2DB-4C79-421A-B3B5-7B3E39903FAF" targetNamespace="http://schemas.microsoft.com/office/2006/metadata/properties" ma:root="true" ma:fieldsID="17524f4cb64685990c7a62925d0c2ba3" ns1:_="" ns2:_="">
     <xsd:import namespace="http://schemas.microsoft.com/sharepoint/v3"/>
@@ -21885,10 +23080,41 @@
 </ct:contentTypeSchema>
 </file>
 
+<file path=customXml/item2.xml><?xml version="1.0" encoding="utf-8"?>
+<p:properties xmlns:p="http://schemas.microsoft.com/office/2006/metadata/properties" xmlns:xsi="http://www.w3.org/2001/XMLSchema-instance" xmlns:pc="http://schemas.microsoft.com/office/infopath/2007/PartnerControls">
+  <documentManagement>
+    <DocumentType xmlns="B52DB2DB-4C79-421A-B3B5-7B3E39903FAF">Presentation</DocumentType>
+    <Tags xmlns="B52DB2DB-4C79-421A-B3B5-7B3E39903FAF"/>
+    <PublishingExpirationDate xmlns="http://schemas.microsoft.com/sharepoint/v3" xsi:nil="true"/>
+    <PublishingStartDate xmlns="http://schemas.microsoft.com/sharepoint/v3" xsi:nil="true"/>
+  </documentManagement>
+</p:properties>
+</file>
+
+<file path=customXml/item3.xml><?xml version="1.0" encoding="utf-8"?>
+<?mso-contentType ?>
+<FormTemplates xmlns="http://schemas.microsoft.com/sharepoint/v3/contenttype/forms">
+  <Display>DocumentLibraryForm</Display>
+  <Edit>DocumentLibraryForm</Edit>
+  <New>DocumentLibraryForm</New>
+</FormTemplates>
+</file>
+
 <file path=customXml/itemProps1.xml><?xml version="1.0" encoding="utf-8"?>
-<ds:datastoreItem xmlns:ds="http://schemas.openxmlformats.org/officeDocument/2006/customXml" ds:itemID="{D408D27A-406B-4DDA-8F91-4CEE5D91D750}">
+<ds:datastoreItem xmlns:ds="http://schemas.openxmlformats.org/officeDocument/2006/customXml" ds:itemID="{F5F1F8D9-8E62-4460-ABC9-6E0C6A11ABB7}">
   <ds:schemaRefs>
-    <ds:schemaRef ds:uri="http://schemas.microsoft.com/sharepoint/v3/contenttype/forms"/>
+    <ds:schemaRef ds:uri="http://schemas.microsoft.com/office/2006/metadata/contentType"/>
+    <ds:schemaRef ds:uri="http://schemas.microsoft.com/office/2006/metadata/properties/metaAttributes"/>
+    <ds:schemaRef ds:uri="http://www.w3.org/2001/XMLSchema"/>
+    <ds:schemaRef ds:uri="http://schemas.microsoft.com/office/2006/metadata/properties"/>
+    <ds:schemaRef ds:uri="http://schemas.microsoft.com/sharepoint/v3"/>
+    <ds:schemaRef ds:uri="B52DB2DB-4C79-421A-B3B5-7B3E39903FAF"/>
+    <ds:schemaRef ds:uri="http://schemas.microsoft.com/office/2006/documentManagement/types"/>
+    <ds:schemaRef ds:uri="http://schemas.microsoft.com/office/infopath/2007/PartnerControls"/>
+    <ds:schemaRef ds:uri="http://schemas.openxmlformats.org/package/2006/metadata/core-properties"/>
+    <ds:schemaRef ds:uri="http://purl.org/dc/elements/1.1/"/>
+    <ds:schemaRef ds:uri="http://purl.org/dc/terms/"/>
+    <ds:schemaRef ds:uri="http://schemas.microsoft.com/internal/obd"/>
   </ds:schemaRefs>
 </ds:datastoreItem>
 </file>
@@ -21911,20 +23137,9 @@
 </file>
 
 <file path=customXml/itemProps3.xml><?xml version="1.0" encoding="utf-8"?>
-<ds:datastoreItem xmlns:ds="http://schemas.openxmlformats.org/officeDocument/2006/customXml" ds:itemID="{F5F1F8D9-8E62-4460-ABC9-6E0C6A11ABB7}">
+<ds:datastoreItem xmlns:ds="http://schemas.openxmlformats.org/officeDocument/2006/customXml" ds:itemID="{D408D27A-406B-4DDA-8F91-4CEE5D91D750}">
   <ds:schemaRefs>
-    <ds:schemaRef ds:uri="http://schemas.microsoft.com/office/2006/metadata/contentType"/>
-    <ds:schemaRef ds:uri="http://schemas.microsoft.com/office/2006/metadata/properties/metaAttributes"/>
-    <ds:schemaRef ds:uri="http://www.w3.org/2001/XMLSchema"/>
-    <ds:schemaRef ds:uri="http://schemas.microsoft.com/office/2006/metadata/properties"/>
-    <ds:schemaRef ds:uri="http://schemas.microsoft.com/sharepoint/v3"/>
-    <ds:schemaRef ds:uri="B52DB2DB-4C79-421A-B3B5-7B3E39903FAF"/>
-    <ds:schemaRef ds:uri="http://schemas.microsoft.com/office/2006/documentManagement/types"/>
-    <ds:schemaRef ds:uri="http://schemas.microsoft.com/office/infopath/2007/PartnerControls"/>
-    <ds:schemaRef ds:uri="http://schemas.openxmlformats.org/package/2006/metadata/core-properties"/>
-    <ds:schemaRef ds:uri="http://purl.org/dc/elements/1.1/"/>
-    <ds:schemaRef ds:uri="http://purl.org/dc/terms/"/>
-    <ds:schemaRef ds:uri="http://schemas.microsoft.com/internal/obd"/>
+    <ds:schemaRef ds:uri="http://schemas.microsoft.com/sharepoint/v3/contenttype/forms"/>
   </ds:schemaRefs>
 </ds:datastoreItem>
 </file>
</xml_diff>